<commit_message>
updated module page, calendar link, gemfile
</commit_message>
<xml_diff>
--- a/Slides/Module 01.2 Requirements.pptx
+++ b/Slides/Module 01.2 Requirements.pptx
@@ -6113,7 +6113,7 @@
           <a:p>
             <a:fld id="{7C7E5181-6CF5-45F7-A87A-E0E0B1FD7549}" type="datetimeFigureOut">
               <a:rPr lang="en-US" smtClean="0"/>
-              <a:t>8/12/2024</a:t>
+              <a:t>8/14/2024</a:t>
             </a:fld>
             <a:endParaRPr lang="en-US"/>
           </a:p>
@@ -9260,7 +9260,7 @@
           <a:p>
             <a:fld id="{5D2A64DE-480B-420F-9649-4F8E696E08E0}" type="datetime1">
               <a:rPr lang="en-US" smtClean="0"/>
-              <a:t>8/12/2024</a:t>
+              <a:t>8/14/2024</a:t>
             </a:fld>
             <a:endParaRPr lang="en-US"/>
           </a:p>
@@ -9584,7 +9584,7 @@
           <a:p>
             <a:fld id="{EA476A42-A091-4468-A075-64A31BE59948}" type="datetime1">
               <a:rPr lang="en-US" smtClean="0"/>
-              <a:t>8/12/2024</a:t>
+              <a:t>8/14/2024</a:t>
             </a:fld>
             <a:endParaRPr lang="en-US"/>
           </a:p>
@@ -9782,7 +9782,7 @@
           <a:p>
             <a:fld id="{0D3616D0-8311-4107-9726-6B805E7D05BA}" type="datetime1">
               <a:rPr lang="en-US" smtClean="0"/>
-              <a:t>8/12/2024</a:t>
+              <a:t>8/14/2024</a:t>
             </a:fld>
             <a:endParaRPr lang="en-US"/>
           </a:p>
@@ -9990,7 +9990,7 @@
           <a:p>
             <a:fld id="{3BC2557A-5C88-417A-A763-5AC779462A5F}" type="datetime1">
               <a:rPr lang="en-US" smtClean="0"/>
-              <a:t>8/12/2024</a:t>
+              <a:t>8/14/2024</a:t>
             </a:fld>
             <a:endParaRPr lang="en-US"/>
           </a:p>
@@ -10514,7 +10514,7 @@
           <a:p>
             <a:fld id="{07C7BFD4-467E-4EDE-93EA-052F5B39A4E5}" type="datetime1">
               <a:rPr lang="en-US" smtClean="0"/>
-              <a:t>8/12/2024</a:t>
+              <a:t>8/14/2024</a:t>
             </a:fld>
             <a:endParaRPr lang="en-US"/>
           </a:p>
@@ -10764,7 +10764,7 @@
           <a:p>
             <a:fld id="{07C7BFD4-467E-4EDE-93EA-052F5B39A4E5}" type="datetime1">
               <a:rPr lang="en-US" smtClean="0"/>
-              <a:t>8/12/2024</a:t>
+              <a:t>8/14/2024</a:t>
             </a:fld>
             <a:endParaRPr lang="en-US"/>
           </a:p>
@@ -10946,7 +10946,7 @@
           <a:p>
             <a:fld id="{109E55A0-C911-4F03-82FC-7E5926047D46}" type="datetime1">
               <a:rPr lang="en-US" smtClean="0"/>
-              <a:t>8/12/2024</a:t>
+              <a:t>8/14/2024</a:t>
             </a:fld>
             <a:endParaRPr lang="en-US"/>
           </a:p>
@@ -11259,7 +11259,7 @@
           <a:p>
             <a:fld id="{A533CBE2-D5BE-47AC-ADC2-9CDFC1D0CF90}" type="datetime1">
               <a:rPr lang="en-US" smtClean="0"/>
-              <a:t>8/12/2024</a:t>
+              <a:t>8/14/2024</a:t>
             </a:fld>
             <a:endParaRPr lang="en-US"/>
           </a:p>
@@ -11560,7 +11560,7 @@
           <a:p>
             <a:fld id="{39B7EDB1-CE74-4951-85A2-0B01C2128E28}" type="datetime1">
               <a:rPr lang="en-US" smtClean="0"/>
-              <a:t>8/12/2024</a:t>
+              <a:t>8/14/2024</a:t>
             </a:fld>
             <a:endParaRPr lang="en-US"/>
           </a:p>
@@ -12008,7 +12008,7 @@
           <a:p>
             <a:fld id="{2BC7EB92-A5C2-4807-A9DC-9EDE6CBFB241}" type="datetime1">
               <a:rPr lang="en-US" smtClean="0"/>
-              <a:t>8/12/2024</a:t>
+              <a:t>8/14/2024</a:t>
             </a:fld>
             <a:endParaRPr lang="en-US"/>
           </a:p>
@@ -12121,7 +12121,7 @@
           <a:p>
             <a:fld id="{2B7B7EE0-7771-4CD5-9B2B-3550753A54A1}" type="datetime1">
               <a:rPr lang="en-US" smtClean="0"/>
-              <a:t>8/12/2024</a:t>
+              <a:t>8/14/2024</a:t>
             </a:fld>
             <a:endParaRPr lang="en-US"/>
           </a:p>
@@ -12432,7 +12432,7 @@
           <a:p>
             <a:fld id="{F8B318B3-0E87-4416-A9B8-D891968C2727}" type="datetime1">
               <a:rPr lang="en-US" smtClean="0"/>
-              <a:t>8/12/2024</a:t>
+              <a:t>8/14/2024</a:t>
             </a:fld>
             <a:endParaRPr lang="en-US"/>
           </a:p>
@@ -12673,7 +12673,7 @@
           <a:p>
             <a:fld id="{54D997E8-DDEE-43F1-8D9B-F8A1E11DE488}" type="datetime1">
               <a:rPr lang="en-US" smtClean="0"/>
-              <a:t>8/12/2024</a:t>
+              <a:t>8/14/2024</a:t>
             </a:fld>
             <a:endParaRPr lang="en-US"/>
           </a:p>
@@ -13172,7 +13172,7 @@
             </a:pPr>
             <a:r>
               <a:rPr lang="en-US" sz="2400" dirty="0"/>
-              <a:t>Jon Bell, Adeel Bhutta and Mitch Wand</a:t>
+              <a:t>Adeel Bhutta and Mitch Wand</a:t>
             </a:r>
           </a:p>
           <a:p>

</xml_diff>